<commit_message>
merged the fine-tuning and train set
</commit_message>
<xml_diff>
--- a/various documents/7th of August presentation.pptx
+++ b/various documents/7th of August presentation.pptx
@@ -10,6 +10,7 @@
     <p:sldId id="258" r:id="rId4"/>
     <p:sldId id="259" r:id="rId5"/>
     <p:sldId id="260" r:id="rId6"/>
+    <p:sldId id="261" r:id="rId7"/>
   </p:sldIdLst>
   <p:sldSz cx="12192000" cy="6858000"/>
   <p:notesSz cx="6858000" cy="9144000"/>
@@ -11661,7 +11662,7 @@
           <a:p>
             <a:fld id="{CEFF5E25-F09A-46A4-A1BD-B5023731D883}" type="datetimeFigureOut">
               <a:rPr lang="en-GB" smtClean="0"/>
-              <a:t>05/08/2024</a:t>
+              <a:t>06/08/2024</a:t>
             </a:fld>
             <a:endParaRPr lang="en-GB"/>
           </a:p>
@@ -11861,7 +11862,7 @@
           <a:p>
             <a:fld id="{CEFF5E25-F09A-46A4-A1BD-B5023731D883}" type="datetimeFigureOut">
               <a:rPr lang="en-GB" smtClean="0"/>
-              <a:t>05/08/2024</a:t>
+              <a:t>06/08/2024</a:t>
             </a:fld>
             <a:endParaRPr lang="en-GB"/>
           </a:p>
@@ -12071,7 +12072,7 @@
           <a:p>
             <a:fld id="{CEFF5E25-F09A-46A4-A1BD-B5023731D883}" type="datetimeFigureOut">
               <a:rPr lang="en-GB" smtClean="0"/>
-              <a:t>05/08/2024</a:t>
+              <a:t>06/08/2024</a:t>
             </a:fld>
             <a:endParaRPr lang="en-GB"/>
           </a:p>
@@ -12271,7 +12272,7 @@
           <a:p>
             <a:fld id="{CEFF5E25-F09A-46A4-A1BD-B5023731D883}" type="datetimeFigureOut">
               <a:rPr lang="en-GB" smtClean="0"/>
-              <a:t>05/08/2024</a:t>
+              <a:t>06/08/2024</a:t>
             </a:fld>
             <a:endParaRPr lang="en-GB"/>
           </a:p>
@@ -12547,7 +12548,7 @@
           <a:p>
             <a:fld id="{CEFF5E25-F09A-46A4-A1BD-B5023731D883}" type="datetimeFigureOut">
               <a:rPr lang="en-GB" smtClean="0"/>
-              <a:t>05/08/2024</a:t>
+              <a:t>06/08/2024</a:t>
             </a:fld>
             <a:endParaRPr lang="en-GB"/>
           </a:p>
@@ -12815,7 +12816,7 @@
           <a:p>
             <a:fld id="{CEFF5E25-F09A-46A4-A1BD-B5023731D883}" type="datetimeFigureOut">
               <a:rPr lang="en-GB" smtClean="0"/>
-              <a:t>05/08/2024</a:t>
+              <a:t>06/08/2024</a:t>
             </a:fld>
             <a:endParaRPr lang="en-GB"/>
           </a:p>
@@ -13230,7 +13231,7 @@
           <a:p>
             <a:fld id="{CEFF5E25-F09A-46A4-A1BD-B5023731D883}" type="datetimeFigureOut">
               <a:rPr lang="en-GB" smtClean="0"/>
-              <a:t>05/08/2024</a:t>
+              <a:t>06/08/2024</a:t>
             </a:fld>
             <a:endParaRPr lang="en-GB"/>
           </a:p>
@@ -13372,7 +13373,7 @@
           <a:p>
             <a:fld id="{CEFF5E25-F09A-46A4-A1BD-B5023731D883}" type="datetimeFigureOut">
               <a:rPr lang="en-GB" smtClean="0"/>
-              <a:t>05/08/2024</a:t>
+              <a:t>06/08/2024</a:t>
             </a:fld>
             <a:endParaRPr lang="en-GB"/>
           </a:p>
@@ -13485,7 +13486,7 @@
           <a:p>
             <a:fld id="{CEFF5E25-F09A-46A4-A1BD-B5023731D883}" type="datetimeFigureOut">
               <a:rPr lang="en-GB" smtClean="0"/>
-              <a:t>05/08/2024</a:t>
+              <a:t>06/08/2024</a:t>
             </a:fld>
             <a:endParaRPr lang="en-GB"/>
           </a:p>
@@ -13798,7 +13799,7 @@
           <a:p>
             <a:fld id="{CEFF5E25-F09A-46A4-A1BD-B5023731D883}" type="datetimeFigureOut">
               <a:rPr lang="en-GB" smtClean="0"/>
-              <a:t>05/08/2024</a:t>
+              <a:t>06/08/2024</a:t>
             </a:fld>
             <a:endParaRPr lang="en-GB"/>
           </a:p>
@@ -14087,7 +14088,7 @@
           <a:p>
             <a:fld id="{CEFF5E25-F09A-46A4-A1BD-B5023731D883}" type="datetimeFigureOut">
               <a:rPr lang="en-GB" smtClean="0"/>
-              <a:t>05/08/2024</a:t>
+              <a:t>06/08/2024</a:t>
             </a:fld>
             <a:endParaRPr lang="en-GB"/>
           </a:p>
@@ -14330,7 +14331,7 @@
           <a:p>
             <a:fld id="{CEFF5E25-F09A-46A4-A1BD-B5023731D883}" type="datetimeFigureOut">
               <a:rPr lang="en-GB" smtClean="0"/>
-              <a:t>05/08/2024</a:t>
+              <a:t>06/08/2024</a:t>
             </a:fld>
             <a:endParaRPr lang="en-GB"/>
           </a:p>
@@ -14808,9 +14809,16 @@
           <a:lstStyle/>
           <a:p>
             <a:r>
-              <a:rPr lang="en-GB" dirty="0"/>
-              <a:t>by Filip Topic</a:t>
-            </a:r>
+              <a:rPr lang="de-AT" dirty="0"/>
+              <a:t>By Filip Topic</a:t>
+            </a:r>
+          </a:p>
+          <a:p>
+            <a:r>
+              <a:rPr lang="de-AT" dirty="0"/>
+              <a:t>Supervisor: Andrea Bassani</a:t>
+            </a:r>
+            <a:endParaRPr lang="en-GB" dirty="0"/>
           </a:p>
         </p:txBody>
       </p:sp>
@@ -16716,6 +16724,84 @@
     <p:extLst>
       <p:ext uri="{BB962C8B-B14F-4D97-AF65-F5344CB8AC3E}">
         <p14:creationId xmlns:p14="http://schemas.microsoft.com/office/powerpoint/2010/main" val="1531572420"/>
+      </p:ext>
+    </p:extLst>
+  </p:cSld>
+  <p:clrMapOvr>
+    <a:masterClrMapping/>
+  </p:clrMapOvr>
+</p:sld>
+</file>
+
+<file path=ppt/slides/slide6.xml><?xml version="1.0" encoding="utf-8"?>
+<p:sld xmlns:a="http://schemas.openxmlformats.org/drawingml/2006/main" xmlns:r="http://schemas.openxmlformats.org/officeDocument/2006/relationships" xmlns:p="http://schemas.openxmlformats.org/presentationml/2006/main">
+  <p:cSld>
+    <p:bg>
+      <p:bgPr>
+        <a:solidFill>
+          <a:schemeClr val="accent5">
+            <a:lumMod val="20000"/>
+            <a:lumOff val="80000"/>
+          </a:schemeClr>
+        </a:solidFill>
+        <a:effectLst/>
+      </p:bgPr>
+    </p:bg>
+    <p:spTree>
+      <p:nvGrpSpPr>
+        <p:cNvPr id="1" name=""/>
+        <p:cNvGrpSpPr/>
+        <p:nvPr/>
+      </p:nvGrpSpPr>
+      <p:grpSpPr>
+        <a:xfrm>
+          <a:off x="0" y="0"/>
+          <a:ext cx="0" cy="0"/>
+          <a:chOff x="0" y="0"/>
+          <a:chExt cx="0" cy="0"/>
+        </a:xfrm>
+      </p:grpSpPr>
+      <p:sp>
+        <p:nvSpPr>
+          <p:cNvPr id="2" name="Title 1">
+            <a:extLst>
+              <a:ext uri="{FF2B5EF4-FFF2-40B4-BE49-F238E27FC236}">
+                <a16:creationId xmlns:a16="http://schemas.microsoft.com/office/drawing/2014/main" id="{C90D24CC-5C8A-D642-B74A-C2C7D2B65AEB}"/>
+              </a:ext>
+            </a:extLst>
+          </p:cNvPr>
+          <p:cNvSpPr>
+            <a:spLocks noGrp="1"/>
+          </p:cNvSpPr>
+          <p:nvPr>
+            <p:ph type="ctrTitle"/>
+          </p:nvPr>
+        </p:nvSpPr>
+        <p:spPr/>
+        <p:txBody>
+          <a:bodyPr/>
+          <a:lstStyle/>
+          <a:p>
+            <a:r>
+              <a:rPr lang="en-GB" dirty="0"/>
+              <a:t>Thank </a:t>
+            </a:r>
+            <a:r>
+              <a:rPr lang="de-AT" dirty="0" err="1"/>
+              <a:t>you</a:t>
+            </a:r>
+            <a:r>
+              <a:rPr lang="de-AT" dirty="0"/>
+              <a:t>!</a:t>
+            </a:r>
+            <a:endParaRPr lang="en-GB" dirty="0"/>
+          </a:p>
+        </p:txBody>
+      </p:sp>
+    </p:spTree>
+    <p:extLst>
+      <p:ext uri="{BB962C8B-B14F-4D97-AF65-F5344CB8AC3E}">
+        <p14:creationId xmlns:p14="http://schemas.microsoft.com/office/powerpoint/2010/main" val="3435533573"/>
       </p:ext>
     </p:extLst>
   </p:cSld>

</xml_diff>